<commit_message>
Added jasa time varying model.
</commit_message>
<xml_diff>
--- a/bin/survival lecture 4.pptx
+++ b/bin/survival lecture 4.pptx
@@ -358,7 +358,7 @@
               <a:pPr>
                 <a:defRPr/>
               </a:pPr>
-              <a:t>5/14/2018</a:t>
+              <a:t>5/19/2018</a:t>
             </a:fld>
             <a:endParaRPr lang="en-US" altLang="en-US"/>
           </a:p>
@@ -666,7 +666,7 @@
               <a:pPr>
                 <a:defRPr/>
               </a:pPr>
-              <a:t>5/14/2018</a:t>
+              <a:t>5/19/2018</a:t>
             </a:fld>
             <a:endParaRPr lang="en-US" altLang="en-US"/>
           </a:p>

</xml_diff>